<commit_message>
Added section on AGILE development
</commit_message>
<xml_diff>
--- a/FinalProjectPresentation.pptx
+++ b/FinalProjectPresentation.pptx
@@ -6,7 +6,7 @@
   </p:sldMasterIdLst>
   <p:sldIdLst>
     <p:sldId id="256" r:id="rId2"/>
-    <p:sldId id="257" r:id="rId3"/>
+    <p:sldId id="279" r:id="rId3"/>
     <p:sldId id="258" r:id="rId4"/>
     <p:sldId id="259" r:id="rId5"/>
     <p:sldId id="264" r:id="rId6"/>
@@ -3575,11 +3575,7 @@
             </a:pPr>
             <a:r>
               <a:rPr lang="en-US" sz="2400" dirty="0" smtClean="0"/>
-              <a:t>P</a:t>
-            </a:r>
-            <a:r>
-              <a:rPr lang="en-US" sz="2400" dirty="0" smtClean="0"/>
-              <a:t>ackage</a:t>
+              <a:t>Package</a:t>
             </a:r>
           </a:p>
           <a:p>
@@ -3593,11 +3589,7 @@
             </a:pPr>
             <a:r>
               <a:rPr lang="en-US" sz="2400" dirty="0" smtClean="0"/>
-              <a:t>C</a:t>
-            </a:r>
-            <a:r>
-              <a:rPr lang="en-US" sz="2400" dirty="0" smtClean="0"/>
-              <a:t>omponent</a:t>
+              <a:t>Component</a:t>
             </a:r>
             <a:endParaRPr lang="en-US" altLang="zh-CN" sz="2400" dirty="0">
               <a:solidFill>
@@ -3835,7 +3827,7 @@
           </p:nvPr>
         </p:nvPicPr>
         <p:blipFill>
-          <a:blip r:embed="rId2"/>
+          <a:blip r:embed="rId2" cstate="print"/>
           <a:srcRect/>
           <a:stretch>
             <a:fillRect/>
@@ -3935,7 +3927,7 @@
           </p:nvPr>
         </p:nvPicPr>
         <p:blipFill>
-          <a:blip r:embed="rId2"/>
+          <a:blip r:embed="rId2" cstate="print"/>
           <a:srcRect/>
           <a:stretch>
             <a:fillRect/>
@@ -4052,7 +4044,7 @@
           <p:nvPr/>
         </p:nvPicPr>
         <p:blipFill>
-          <a:blip r:embed="rId2"/>
+          <a:blip r:embed="rId2" cstate="print"/>
           <a:srcRect/>
           <a:stretch>
             <a:fillRect/>
@@ -4078,7 +4070,7 @@
           <p:nvPr/>
         </p:nvPicPr>
         <p:blipFill>
-          <a:blip r:embed="rId3"/>
+          <a:blip r:embed="rId3" cstate="print"/>
           <a:srcRect/>
           <a:stretch>
             <a:fillRect/>
@@ -4558,7 +4550,7 @@
           <a:p>
             <a:r>
               <a:rPr lang="en-US" dirty="0" smtClean="0"/>
-              <a:t>AGILE</a:t>
+              <a:t>Why we used AGILE</a:t>
             </a:r>
             <a:endParaRPr lang="en-US" dirty="0"/>
           </a:p>
@@ -4566,20 +4558,195 @@
       </p:sp>
       <p:sp>
         <p:nvSpPr>
-          <p:cNvPr id="3" name="Content Placeholder 2"/>
-          <p:cNvSpPr>
-            <a:spLocks noGrp="1"/>
-          </p:cNvSpPr>
-          <p:nvPr>
-            <p:ph idx="1"/>
-          </p:nvPr>
-        </p:nvSpPr>
-        <p:spPr/>
-        <p:txBody>
-          <a:bodyPr/>
-          <a:lstStyle/>
-          <a:p>
-            <a:endParaRPr lang="en-US"/>
+          <p:cNvPr id="4" name="Text Placeholder 3"/>
+          <p:cNvSpPr>
+            <a:spLocks noGrp="1"/>
+          </p:cNvSpPr>
+          <p:nvPr>
+            <p:ph type="body" idx="1"/>
+          </p:nvPr>
+        </p:nvSpPr>
+        <p:spPr/>
+        <p:txBody>
+          <a:bodyPr/>
+          <a:lstStyle/>
+          <a:p>
+            <a:endParaRPr lang="en-US"/>
+          </a:p>
+        </p:txBody>
+      </p:sp>
+      <p:sp>
+        <p:nvSpPr>
+          <p:cNvPr id="5" name="Content Placeholder 4"/>
+          <p:cNvSpPr>
+            <a:spLocks noGrp="1"/>
+          </p:cNvSpPr>
+          <p:nvPr>
+            <p:ph sz="half" idx="2"/>
+          </p:nvPr>
+        </p:nvSpPr>
+        <p:spPr/>
+        <p:txBody>
+          <a:bodyPr>
+            <a:normAutofit lnSpcReduction="10000"/>
+          </a:bodyPr>
+          <a:lstStyle/>
+          <a:p>
+            <a:r>
+              <a:rPr lang="en-US" dirty="0" smtClean="0"/>
+              <a:t>Agile has less limitations than traditional plan-driven methodologies</a:t>
+            </a:r>
+          </a:p>
+          <a:p>
+            <a:r>
+              <a:rPr lang="en-US" dirty="0" smtClean="0"/>
+              <a:t>We favor:</a:t>
+            </a:r>
+          </a:p>
+          <a:p>
+            <a:pPr lvl="1" eaLnBrk="0" hangingPunct="0">
+              <a:lnSpc>
+                <a:spcPct val="90000"/>
+              </a:lnSpc>
+              <a:spcBef>
+                <a:spcPts val="300"/>
+              </a:spcBef>
+              <a:buFontTx/>
+              <a:buChar char="•"/>
+            </a:pPr>
+            <a:r>
+              <a:rPr lang="en-US" dirty="0" smtClean="0"/>
+              <a:t>Individuals and interactions over processes and tools </a:t>
+            </a:r>
+          </a:p>
+          <a:p>
+            <a:pPr lvl="1" eaLnBrk="0" hangingPunct="0">
+              <a:lnSpc>
+                <a:spcPct val="90000"/>
+              </a:lnSpc>
+              <a:spcBef>
+                <a:spcPts val="300"/>
+              </a:spcBef>
+              <a:buFontTx/>
+              <a:buChar char="•"/>
+            </a:pPr>
+            <a:r>
+              <a:rPr lang="en-US" dirty="0" smtClean="0"/>
+              <a:t>Working software over comprehensive documentation </a:t>
+            </a:r>
+          </a:p>
+          <a:p>
+            <a:pPr lvl="1" eaLnBrk="0" hangingPunct="0">
+              <a:lnSpc>
+                <a:spcPct val="90000"/>
+              </a:lnSpc>
+              <a:spcBef>
+                <a:spcPts val="300"/>
+              </a:spcBef>
+              <a:buFontTx/>
+              <a:buChar char="•"/>
+            </a:pPr>
+            <a:r>
+              <a:rPr lang="en-US" dirty="0" smtClean="0"/>
+              <a:t>Customer collaboration over contract negotiation </a:t>
+            </a:r>
+          </a:p>
+          <a:p>
+            <a:pPr lvl="1" eaLnBrk="0" hangingPunct="0">
+              <a:lnSpc>
+                <a:spcPct val="90000"/>
+              </a:lnSpc>
+              <a:spcBef>
+                <a:spcPts val="300"/>
+              </a:spcBef>
+              <a:buFontTx/>
+              <a:buChar char="•"/>
+            </a:pPr>
+            <a:r>
+              <a:rPr lang="en-US" dirty="0" smtClean="0"/>
+              <a:t>Responding to change over following a plan </a:t>
+            </a:r>
+          </a:p>
+          <a:p>
+            <a:endParaRPr lang="en-US" dirty="0" smtClean="0"/>
+          </a:p>
+        </p:txBody>
+      </p:sp>
+      <p:sp>
+        <p:nvSpPr>
+          <p:cNvPr id="6" name="Text Placeholder 5"/>
+          <p:cNvSpPr>
+            <a:spLocks noGrp="1"/>
+          </p:cNvSpPr>
+          <p:nvPr>
+            <p:ph type="body" sz="quarter" idx="3"/>
+          </p:nvPr>
+        </p:nvSpPr>
+        <p:spPr/>
+        <p:txBody>
+          <a:bodyPr/>
+          <a:lstStyle/>
+          <a:p>
+            <a:endParaRPr lang="en-US"/>
+          </a:p>
+        </p:txBody>
+      </p:sp>
+      <p:sp>
+        <p:nvSpPr>
+          <p:cNvPr id="7" name="Content Placeholder 6"/>
+          <p:cNvSpPr>
+            <a:spLocks noGrp="1"/>
+          </p:cNvSpPr>
+          <p:nvPr>
+            <p:ph sz="quarter" idx="4"/>
+          </p:nvPr>
+        </p:nvSpPr>
+        <p:spPr/>
+        <p:txBody>
+          <a:bodyPr>
+            <a:normAutofit/>
+          </a:bodyPr>
+          <a:lstStyle/>
+          <a:p>
+            <a:endParaRPr lang="en-US" dirty="0" smtClean="0"/>
+          </a:p>
+          <a:p>
+            <a:endParaRPr lang="en-US" dirty="0" smtClean="0"/>
+          </a:p>
+          <a:p>
+            <a:endParaRPr lang="en-US" sz="2000" dirty="0" smtClean="0"/>
+          </a:p>
+          <a:p>
+            <a:r>
+              <a:rPr lang="en-US" sz="2000" dirty="0" smtClean="0"/>
+              <a:t>We collaborated thru our google group, google wave, redmine</a:t>
+            </a:r>
+          </a:p>
+          <a:p>
+            <a:r>
+              <a:rPr lang="en-US" sz="2000" dirty="0" smtClean="0"/>
+              <a:t>Self-documenting code</a:t>
+            </a:r>
+          </a:p>
+          <a:p>
+            <a:r>
+              <a:rPr lang="en-US" sz="2000" dirty="0" smtClean="0"/>
+              <a:t>Made SRS at start of semester,  responded to clients' requests</a:t>
+            </a:r>
+          </a:p>
+          <a:p>
+            <a:r>
+              <a:rPr lang="en-US" sz="2000" dirty="0" smtClean="0"/>
+              <a:t>Instead of using a </a:t>
+            </a:r>
+            <a:r>
+              <a:rPr lang="en-US" sz="2000" dirty="0" err="1" smtClean="0"/>
+              <a:t>ghant</a:t>
+            </a:r>
+            <a:r>
+              <a:rPr lang="en-US" sz="2000" dirty="0" smtClean="0"/>
+              <a:t> chart, we based what to do off of key importance</a:t>
+            </a:r>
           </a:p>
         </p:txBody>
       </p:sp>
@@ -4971,27 +5138,7 @@
                 <a:latin typeface="Arial" charset="0"/>
                 <a:ea typeface="宋体" charset="-122"/>
               </a:rPr>
-              <a:t>Sensible PHP is a small, basic and simple framework,</a:t>
-            </a:r>
-            <a:r>
-              <a:rPr lang="en-US" altLang="zh-CN" sz="2400" dirty="0" smtClean="0">
-                <a:solidFill>
-                  <a:srgbClr val="000000"/>
-                </a:solidFill>
-                <a:latin typeface="Arial" charset="0"/>
-                <a:ea typeface="宋体" charset="-122"/>
-              </a:rPr>
-              <a:t> </a:t>
-            </a:r>
-            <a:r>
-              <a:rPr lang="en-US" altLang="zh-CN" sz="2400" dirty="0" smtClean="0">
-                <a:solidFill>
-                  <a:srgbClr val="000000"/>
-                </a:solidFill>
-                <a:latin typeface="Arial" charset="0"/>
-                <a:ea typeface="宋体" charset="-122"/>
-              </a:rPr>
-              <a:t>and it’s new and great!</a:t>
+              <a:t>Sensible PHP is a small, basic and simple framework, and it’s new and great!</a:t>
             </a:r>
           </a:p>
           <a:p>
@@ -5265,7 +5412,7 @@
           </p:nvPr>
         </p:nvPicPr>
         <p:blipFill>
-          <a:blip r:embed="rId2"/>
+          <a:blip r:embed="rId2" cstate="print"/>
           <a:stretch>
             <a:fillRect/>
           </a:stretch>

</xml_diff>